<commit_message>
cjk final presi push
</commit_message>
<xml_diff>
--- a/First Project Data and Code/Cardiovascular Mortality Presentation CJK edits.pptx
+++ b/First Project Data and Code/Cardiovascular Mortality Presentation CJK edits.pptx
@@ -213,7 +213,7 @@
           <a:p>
             <a:fld id="{379DA041-9F22-4583-A033-688ED897DD84}" type="datetimeFigureOut">
               <a:rPr lang="en-US" smtClean="0"/>
-              <a:t>12/8/2018</a:t>
+              <a:t>12/15/2018</a:t>
             </a:fld>
             <a:endParaRPr lang="en-US"/>
           </a:p>
@@ -627,7 +627,7 @@
           <a:p>
             <a:fld id="{3EB66871-4E60-40B2-816D-482DF2254817}" type="datetimeFigureOut">
               <a:rPr lang="en-US" smtClean="0"/>
-              <a:t>12/8/2018</a:t>
+              <a:t>12/15/2018</a:t>
             </a:fld>
             <a:endParaRPr lang="en-US"/>
           </a:p>
@@ -825,7 +825,7 @@
           <a:p>
             <a:fld id="{3EB66871-4E60-40B2-816D-482DF2254817}" type="datetimeFigureOut">
               <a:rPr lang="en-US" smtClean="0"/>
-              <a:t>12/8/2018</a:t>
+              <a:t>12/15/2018</a:t>
             </a:fld>
             <a:endParaRPr lang="en-US"/>
           </a:p>
@@ -1033,7 +1033,7 @@
           <a:p>
             <a:fld id="{3EB66871-4E60-40B2-816D-482DF2254817}" type="datetimeFigureOut">
               <a:rPr lang="en-US" smtClean="0"/>
-              <a:t>12/8/2018</a:t>
+              <a:t>12/15/2018</a:t>
             </a:fld>
             <a:endParaRPr lang="en-US"/>
           </a:p>
@@ -1231,7 +1231,7 @@
           <a:p>
             <a:fld id="{3EB66871-4E60-40B2-816D-482DF2254817}" type="datetimeFigureOut">
               <a:rPr lang="en-US" smtClean="0"/>
-              <a:t>12/8/2018</a:t>
+              <a:t>12/15/2018</a:t>
             </a:fld>
             <a:endParaRPr lang="en-US"/>
           </a:p>
@@ -1506,7 +1506,7 @@
           <a:p>
             <a:fld id="{3EB66871-4E60-40B2-816D-482DF2254817}" type="datetimeFigureOut">
               <a:rPr lang="en-US" smtClean="0"/>
-              <a:t>12/8/2018</a:t>
+              <a:t>12/15/2018</a:t>
             </a:fld>
             <a:endParaRPr lang="en-US"/>
           </a:p>
@@ -1771,7 +1771,7 @@
           <a:p>
             <a:fld id="{3EB66871-4E60-40B2-816D-482DF2254817}" type="datetimeFigureOut">
               <a:rPr lang="en-US" smtClean="0"/>
-              <a:t>12/8/2018</a:t>
+              <a:t>12/15/2018</a:t>
             </a:fld>
             <a:endParaRPr lang="en-US"/>
           </a:p>
@@ -2183,7 +2183,7 @@
           <a:p>
             <a:fld id="{3EB66871-4E60-40B2-816D-482DF2254817}" type="datetimeFigureOut">
               <a:rPr lang="en-US" smtClean="0"/>
-              <a:t>12/8/2018</a:t>
+              <a:t>12/15/2018</a:t>
             </a:fld>
             <a:endParaRPr lang="en-US"/>
           </a:p>
@@ -2324,7 +2324,7 @@
           <a:p>
             <a:fld id="{3EB66871-4E60-40B2-816D-482DF2254817}" type="datetimeFigureOut">
               <a:rPr lang="en-US" smtClean="0"/>
-              <a:t>12/8/2018</a:t>
+              <a:t>12/15/2018</a:t>
             </a:fld>
             <a:endParaRPr lang="en-US"/>
           </a:p>
@@ -2437,7 +2437,7 @@
           <a:p>
             <a:fld id="{3EB66871-4E60-40B2-816D-482DF2254817}" type="datetimeFigureOut">
               <a:rPr lang="en-US" smtClean="0"/>
-              <a:t>12/8/2018</a:t>
+              <a:t>12/15/2018</a:t>
             </a:fld>
             <a:endParaRPr lang="en-US"/>
           </a:p>
@@ -2748,7 +2748,7 @@
           <a:p>
             <a:fld id="{3EB66871-4E60-40B2-816D-482DF2254817}" type="datetimeFigureOut">
               <a:rPr lang="en-US" smtClean="0"/>
-              <a:t>12/8/2018</a:t>
+              <a:t>12/15/2018</a:t>
             </a:fld>
             <a:endParaRPr lang="en-US"/>
           </a:p>
@@ -3036,7 +3036,7 @@
           <a:p>
             <a:fld id="{3EB66871-4E60-40B2-816D-482DF2254817}" type="datetimeFigureOut">
               <a:rPr lang="en-US" smtClean="0"/>
-              <a:t>12/8/2018</a:t>
+              <a:t>12/15/2018</a:t>
             </a:fld>
             <a:endParaRPr lang="en-US"/>
           </a:p>
@@ -3277,7 +3277,7 @@
           <a:p>
             <a:fld id="{3EB66871-4E60-40B2-816D-482DF2254817}" type="datetimeFigureOut">
               <a:rPr lang="en-US" smtClean="0"/>
-              <a:t>12/8/2018</a:t>
+              <a:t>12/15/2018</a:t>
             </a:fld>
             <a:endParaRPr lang="en-US"/>
           </a:p>
@@ -6490,22 +6490,7 @@
                   <a:schemeClr val="accent1"/>
                 </a:solidFill>
               </a:rPr>
-              <a:t>Data Cleanup &amp;</a:t>
-            </a:r>
-            <a:br>
-              <a:rPr lang="en-US" dirty="0">
-                <a:solidFill>
-                  <a:schemeClr val="accent1"/>
-                </a:solidFill>
-              </a:rPr>
-            </a:br>
-            <a:r>
-              <a:rPr lang="en-US" dirty="0">
-                <a:solidFill>
-                  <a:schemeClr val="accent1"/>
-                </a:solidFill>
-              </a:rPr>
-              <a:t>Data Interpretation</a:t>
+              <a:t>Data Cleanup</a:t>
             </a:r>
           </a:p>
         </p:txBody>
@@ -7042,22 +7027,7 @@
                   <a:schemeClr val="accent1"/>
                 </a:solidFill>
               </a:rPr>
-              <a:t>Data Cleanup &amp;</a:t>
-            </a:r>
-            <a:br>
-              <a:rPr lang="en-US" dirty="0">
-                <a:solidFill>
-                  <a:schemeClr val="accent1"/>
-                </a:solidFill>
-              </a:rPr>
-            </a:br>
-            <a:r>
-              <a:rPr lang="en-US" dirty="0">
-                <a:solidFill>
-                  <a:schemeClr val="accent1"/>
-                </a:solidFill>
-              </a:rPr>
-              <a:t>Data Interpretation Cont.</a:t>
+              <a:t>Data Cleanup</a:t>
             </a:r>
           </a:p>
         </p:txBody>
@@ -7649,7 +7619,7 @@
                   <a:schemeClr val="accent1"/>
                 </a:solidFill>
               </a:rPr>
-              <a:t>Data Interpretation Cont.</a:t>
+              <a:t>Final DF</a:t>
             </a:r>
           </a:p>
         </p:txBody>
@@ -7709,6 +7679,42 @@
           </a:fontRef>
         </p:style>
       </p:cxnSp>
+      <p:pic>
+        <p:nvPicPr>
+          <p:cNvPr id="3" name="Picture 2">
+            <a:extLst>
+              <a:ext uri="{FF2B5EF4-FFF2-40B4-BE49-F238E27FC236}">
+                <a16:creationId xmlns:a16="http://schemas.microsoft.com/office/drawing/2014/main" id="{C2AE26EA-1B16-462B-9D6D-7B2B0E4BC717}"/>
+              </a:ext>
+            </a:extLst>
+          </p:cNvPr>
+          <p:cNvPicPr>
+            <a:picLocks noChangeAspect="1"/>
+          </p:cNvPicPr>
+          <p:nvPr/>
+        </p:nvPicPr>
+        <p:blipFill>
+          <a:blip r:embed="rId2">
+            <a:extLst>
+              <a:ext uri="{28A0092B-C50C-407E-A947-70E740481C1C}">
+                <a14:useLocalDpi xmlns:a14="http://schemas.microsoft.com/office/drawing/2010/main" val="0"/>
+              </a:ext>
+            </a:extLst>
+          </a:blip>
+          <a:stretch>
+            <a:fillRect/>
+          </a:stretch>
+        </p:blipFill>
+        <p:spPr>
+          <a:xfrm>
+            <a:off x="4715617" y="2556769"/>
+            <a:ext cx="7175259" cy="1615736"/>
+          </a:xfrm>
+          <a:prstGeom prst="rect">
+            <a:avLst/>
+          </a:prstGeom>
+        </p:spPr>
+      </p:pic>
     </p:spTree>
     <p:extLst>
       <p:ext uri="{BB962C8B-B14F-4D97-AF65-F5344CB8AC3E}">

</xml_diff>